<commit_message>
Voilà le powerpoint, il manque juste la partie concenrant la coo mais max s'en occupe, après je sais pas si c'est comme ça que vous le vouliez mais bon si vous êtes pas heureux vous l'arrangez
</commit_message>
<xml_diff>
--- a/ProjetS2/PresentationProjetS2.pptx
+++ b/ProjetS2/PresentationProjetS2.pptx
@@ -24,6 +24,16 @@
     <p:sldId id="272" r:id="rId18"/>
     <p:sldId id="273" r:id="rId19"/>
     <p:sldId id="274" r:id="rId20"/>
+    <p:sldId id="275" r:id="rId21"/>
+    <p:sldId id="276" r:id="rId22"/>
+    <p:sldId id="277" r:id="rId23"/>
+    <p:sldId id="278" r:id="rId24"/>
+    <p:sldId id="279" r:id="rId25"/>
+    <p:sldId id="280" r:id="rId26"/>
+    <p:sldId id="281" r:id="rId27"/>
+    <p:sldId id="282" r:id="rId28"/>
+    <p:sldId id="283" r:id="rId29"/>
+    <p:sldId id="284" r:id="rId30"/>
   </p:sldIdLst>
   <p:sldSz cx="12192000" cy="6858000"/>
   <p:notesSz cx="6858000" cy="9144000"/>
@@ -6439,19 +6449,9 @@
                   </a:srgbClr>
                 </a:solidFill>
               </a:rPr>
-              <a:t>C. </a:t>
-            </a:r>
-            <a:r>
-              <a:rPr lang="fr-FR">
-                <a:solidFill>
-                  <a:srgbClr val="BD582C">
-                    <a:lumMod val="75000"/>
-                  </a:srgbClr>
-                </a:solidFill>
-              </a:rPr>
-              <a:t>Conception</a:t>
-            </a:r>
-            <a:endParaRPr lang="fr-FR"/>
+              <a:t>C. Conception</a:t>
+            </a:r>
+            <a:endParaRPr lang="fr-FR" dirty="0"/>
           </a:p>
         </p:txBody>
       </p:sp>
@@ -6538,7 +6538,17 @@
           <a:bodyPr/>
           <a:lstStyle/>
           <a:p>
-            <a:endParaRPr lang="fr-FR"/>
+            <a:r>
+              <a:rPr lang="fr-FR" dirty="0" smtClean="0">
+                <a:solidFill>
+                  <a:srgbClr val="BD582C">
+                    <a:lumMod val="75000"/>
+                  </a:srgbClr>
+                </a:solidFill>
+              </a:rPr>
+              <a:t>D. Codage</a:t>
+            </a:r>
+            <a:endParaRPr lang="fr-FR" dirty="0"/>
           </a:p>
         </p:txBody>
       </p:sp>
@@ -6557,7 +6567,36 @@
           <a:bodyPr/>
           <a:lstStyle/>
           <a:p>
-            <a:endParaRPr lang="fr-FR"/>
+            <a:endParaRPr lang="fr-FR" dirty="0" smtClean="0"/>
+          </a:p>
+          <a:p>
+            <a:pPr marL="91440" lvl="3" indent="-91440">
+              <a:spcBef>
+                <a:spcPts val="1200"/>
+              </a:spcBef>
+              <a:spcAft>
+                <a:spcPts val="200"/>
+              </a:spcAft>
+              <a:buSzPct val="100000"/>
+              <a:buFont typeface="Calibri" panose="020F0502020204030204" pitchFamily="34" charset="0"/>
+              <a:buChar char=" "/>
+            </a:pPr>
+            <a:r>
+              <a:rPr lang="fr-FR" sz="3200" dirty="0" smtClean="0">
+                <a:solidFill>
+                  <a:srgbClr val="FFC000"/>
+                </a:solidFill>
+              </a:rPr>
+              <a:t>Fonctionnement de l’application</a:t>
+            </a:r>
+            <a:endParaRPr lang="fr-FR" sz="3200" dirty="0">
+              <a:solidFill>
+                <a:srgbClr val="FFC000"/>
+              </a:solidFill>
+            </a:endParaRPr>
+          </a:p>
+          <a:p>
+            <a:endParaRPr lang="fr-FR" dirty="0"/>
           </a:p>
         </p:txBody>
       </p:sp>
@@ -6787,6 +6826,1242 @@
       </p:transition>
     </mc:Choice>
     <mc:Fallback xmlns="">
+      <p:transition spd="slow">
+        <p:fade/>
+      </p:transition>
+    </mc:Fallback>
+  </mc:AlternateContent>
+  <p:timing>
+    <p:tnLst>
+      <p:par>
+        <p:cTn id="1" dur="indefinite" restart="never" nodeType="tmRoot"/>
+      </p:par>
+    </p:tnLst>
+  </p:timing>
+</p:sld>
+</file>
+
+<file path=ppt/slides/slide20.xml><?xml version="1.0" encoding="utf-8"?>
+<p:sld xmlns:a="http://schemas.openxmlformats.org/drawingml/2006/main" xmlns:r="http://schemas.openxmlformats.org/officeDocument/2006/relationships" xmlns:p="http://schemas.openxmlformats.org/presentationml/2006/main">
+  <p:cSld>
+    <p:spTree>
+      <p:nvGrpSpPr>
+        <p:cNvPr id="1" name=""/>
+        <p:cNvGrpSpPr/>
+        <p:nvPr/>
+      </p:nvGrpSpPr>
+      <p:grpSpPr>
+        <a:xfrm>
+          <a:off x="0" y="0"/>
+          <a:ext cx="0" cy="0"/>
+          <a:chOff x="0" y="0"/>
+          <a:chExt cx="0" cy="0"/>
+        </a:xfrm>
+      </p:grpSpPr>
+      <p:sp>
+        <p:nvSpPr>
+          <p:cNvPr id="2" name="Titre 1"/>
+          <p:cNvSpPr>
+            <a:spLocks noGrp="1"/>
+          </p:cNvSpPr>
+          <p:nvPr>
+            <p:ph type="title"/>
+          </p:nvPr>
+        </p:nvSpPr>
+        <p:spPr/>
+        <p:txBody>
+          <a:bodyPr/>
+          <a:lstStyle/>
+          <a:p>
+            <a:r>
+              <a:rPr lang="fr-FR" dirty="0" smtClean="0">
+                <a:solidFill>
+                  <a:srgbClr val="BD582C">
+                    <a:lumMod val="75000"/>
+                  </a:srgbClr>
+                </a:solidFill>
+              </a:rPr>
+              <a:t>E. Tests</a:t>
+            </a:r>
+            <a:endParaRPr lang="fr-FR" dirty="0"/>
+          </a:p>
+        </p:txBody>
+      </p:sp>
+      <p:sp>
+        <p:nvSpPr>
+          <p:cNvPr id="3" name="Espace réservé du contenu 2"/>
+          <p:cNvSpPr>
+            <a:spLocks noGrp="1"/>
+          </p:cNvSpPr>
+          <p:nvPr>
+            <p:ph idx="1"/>
+          </p:nvPr>
+        </p:nvSpPr>
+        <p:spPr/>
+        <p:txBody>
+          <a:bodyPr/>
+          <a:lstStyle/>
+          <a:p>
+            <a:pPr marL="91440" lvl="3" indent="-91440">
+              <a:spcBef>
+                <a:spcPts val="1200"/>
+              </a:spcBef>
+              <a:spcAft>
+                <a:spcPts val="200"/>
+              </a:spcAft>
+              <a:buSzPct val="100000"/>
+              <a:buFont typeface="Calibri" panose="020F0502020204030204" pitchFamily="34" charset="0"/>
+              <a:buChar char=" "/>
+            </a:pPr>
+            <a:endParaRPr lang="fr-FR" sz="3200" dirty="0" smtClean="0">
+              <a:solidFill>
+                <a:srgbClr val="FFC000"/>
+              </a:solidFill>
+            </a:endParaRPr>
+          </a:p>
+          <a:p>
+            <a:pPr marL="91440" lvl="3" indent="-91440">
+              <a:spcBef>
+                <a:spcPts val="1200"/>
+              </a:spcBef>
+              <a:spcAft>
+                <a:spcPts val="200"/>
+              </a:spcAft>
+              <a:buSzPct val="100000"/>
+              <a:buFont typeface="Calibri" panose="020F0502020204030204" pitchFamily="34" charset="0"/>
+              <a:buChar char=" "/>
+            </a:pPr>
+            <a:r>
+              <a:rPr lang="fr-FR" sz="3200" dirty="0" smtClean="0">
+                <a:solidFill>
+                  <a:srgbClr val="FFC000"/>
+                </a:solidFill>
+              </a:rPr>
+              <a:t>1) Programmes de tests</a:t>
+            </a:r>
+          </a:p>
+          <a:p>
+            <a:pPr marL="91440" lvl="3" indent="-91440">
+              <a:spcBef>
+                <a:spcPts val="1200"/>
+              </a:spcBef>
+              <a:spcAft>
+                <a:spcPts val="200"/>
+              </a:spcAft>
+              <a:buSzPct val="100000"/>
+              <a:buFont typeface="Calibri" panose="020F0502020204030204" pitchFamily="34" charset="0"/>
+              <a:buChar char=" "/>
+            </a:pPr>
+            <a:endParaRPr lang="fr-FR" sz="3200" dirty="0" smtClean="0">
+              <a:solidFill>
+                <a:srgbClr val="FFC000"/>
+              </a:solidFill>
+            </a:endParaRPr>
+          </a:p>
+          <a:p>
+            <a:pPr marL="91440" lvl="3" indent="-91440">
+              <a:spcBef>
+                <a:spcPts val="1200"/>
+              </a:spcBef>
+              <a:spcAft>
+                <a:spcPts val="200"/>
+              </a:spcAft>
+              <a:buSzPct val="100000"/>
+              <a:buFont typeface="Calibri" panose="020F0502020204030204" pitchFamily="34" charset="0"/>
+              <a:buChar char=" "/>
+            </a:pPr>
+            <a:r>
+              <a:rPr lang="fr-FR" sz="3200" dirty="0" smtClean="0">
+                <a:solidFill>
+                  <a:srgbClr val="FFC000"/>
+                </a:solidFill>
+              </a:rPr>
+              <a:t>2) Résultat des programmes de test</a:t>
+            </a:r>
+            <a:endParaRPr lang="fr-FR" sz="3200" dirty="0">
+              <a:solidFill>
+                <a:srgbClr val="FFC000"/>
+              </a:solidFill>
+            </a:endParaRPr>
+          </a:p>
+          <a:p>
+            <a:endParaRPr lang="fr-FR" dirty="0"/>
+          </a:p>
+        </p:txBody>
+      </p:sp>
+    </p:spTree>
+    <p:extLst>
+      <p:ext uri="{BB962C8B-B14F-4D97-AF65-F5344CB8AC3E}">
+        <p14:creationId xmlns:p14="http://schemas.microsoft.com/office/powerpoint/2010/main" val="3311107184"/>
+      </p:ext>
+    </p:extLst>
+  </p:cSld>
+  <p:clrMapOvr>
+    <a:masterClrMapping/>
+  </p:clrMapOvr>
+  <mc:AlternateContent xmlns:mc="http://schemas.openxmlformats.org/markup-compatibility/2006">
+    <mc:Choice xmlns:p14="http://schemas.microsoft.com/office/powerpoint/2010/main" Requires="p14">
+      <p:transition spd="slow" p14:dur="3000">
+        <p14:reveal/>
+      </p:transition>
+    </mc:Choice>
+    <mc:Fallback>
+      <p:transition spd="slow">
+        <p:fade/>
+      </p:transition>
+    </mc:Fallback>
+  </mc:AlternateContent>
+  <p:timing>
+    <p:tnLst>
+      <p:par>
+        <p:cTn id="1" dur="indefinite" restart="never" nodeType="tmRoot"/>
+      </p:par>
+    </p:tnLst>
+  </p:timing>
+</p:sld>
+</file>
+
+<file path=ppt/slides/slide21.xml><?xml version="1.0" encoding="utf-8"?>
+<p:sld xmlns:a="http://schemas.openxmlformats.org/drawingml/2006/main" xmlns:r="http://schemas.openxmlformats.org/officeDocument/2006/relationships" xmlns:p="http://schemas.openxmlformats.org/presentationml/2006/main">
+  <p:cSld>
+    <p:spTree>
+      <p:nvGrpSpPr>
+        <p:cNvPr id="1" name=""/>
+        <p:cNvGrpSpPr/>
+        <p:nvPr/>
+      </p:nvGrpSpPr>
+      <p:grpSpPr>
+        <a:xfrm>
+          <a:off x="0" y="0"/>
+          <a:ext cx="0" cy="0"/>
+          <a:chOff x="0" y="0"/>
+          <a:chExt cx="0" cy="0"/>
+        </a:xfrm>
+      </p:grpSpPr>
+      <p:sp>
+        <p:nvSpPr>
+          <p:cNvPr id="2" name="Titre 1"/>
+          <p:cNvSpPr>
+            <a:spLocks noGrp="1"/>
+          </p:cNvSpPr>
+          <p:nvPr>
+            <p:ph type="title"/>
+          </p:nvPr>
+        </p:nvSpPr>
+        <p:spPr>
+          <a:xfrm>
+            <a:off x="942733" y="31745"/>
+            <a:ext cx="10058400" cy="1209326"/>
+          </a:xfrm>
+        </p:spPr>
+        <p:txBody>
+          <a:bodyPr>
+            <a:normAutofit/>
+          </a:bodyPr>
+          <a:lstStyle/>
+          <a:p>
+            <a:r>
+              <a:rPr lang="fr-FR" sz="3200" b="1" cap="small" dirty="0"/>
+              <a:t>- </a:t>
+            </a:r>
+            <a:r>
+              <a:rPr lang="fr-FR" sz="3200" b="1" cap="small" dirty="0" err="1"/>
+              <a:t>TestCommandesCalculatrice</a:t>
+            </a:r>
+            <a:r>
+              <a:rPr lang="fr-FR" sz="3200" b="1" cap="small" dirty="0"/>
+              <a:t/>
+            </a:r>
+            <a:br>
+              <a:rPr lang="fr-FR" sz="3200" b="1" cap="small" dirty="0"/>
+            </a:br>
+            <a:endParaRPr lang="fr-FR" sz="3200" dirty="0"/>
+          </a:p>
+        </p:txBody>
+      </p:sp>
+      <p:sp>
+        <p:nvSpPr>
+          <p:cNvPr id="3" name="Espace réservé du contenu 2"/>
+          <p:cNvSpPr>
+            <a:spLocks noGrp="1"/>
+          </p:cNvSpPr>
+          <p:nvPr>
+            <p:ph idx="1"/>
+          </p:nvPr>
+        </p:nvSpPr>
+        <p:spPr>
+          <a:xfrm>
+            <a:off x="1097280" y="1845734"/>
+            <a:ext cx="10058400" cy="4323246"/>
+          </a:xfrm>
+        </p:spPr>
+        <p:txBody>
+          <a:bodyPr/>
+          <a:lstStyle/>
+          <a:p>
+            <a:endParaRPr lang="fr-FR" dirty="0"/>
+          </a:p>
+        </p:txBody>
+      </p:sp>
+      <p:pic>
+        <p:nvPicPr>
+          <p:cNvPr id="4" name="Picture 1"/>
+          <p:cNvPicPr/>
+          <p:nvPr/>
+        </p:nvPicPr>
+        <p:blipFill>
+          <a:blip r:embed="rId2" cstate="print"/>
+          <a:srcRect/>
+          <a:stretch>
+            <a:fillRect/>
+          </a:stretch>
+        </p:blipFill>
+        <p:spPr bwMode="auto">
+          <a:xfrm>
+            <a:off x="669701" y="953037"/>
+            <a:ext cx="10612191" cy="5324318"/>
+          </a:xfrm>
+          <a:prstGeom prst="rect">
+            <a:avLst/>
+          </a:prstGeom>
+          <a:noFill/>
+          <a:ln w="9525">
+            <a:noFill/>
+            <a:miter lim="800000"/>
+            <a:headEnd/>
+            <a:tailEnd/>
+          </a:ln>
+        </p:spPr>
+      </p:pic>
+    </p:spTree>
+    <p:extLst>
+      <p:ext uri="{BB962C8B-B14F-4D97-AF65-F5344CB8AC3E}">
+        <p14:creationId xmlns:p14="http://schemas.microsoft.com/office/powerpoint/2010/main" val="3991831653"/>
+      </p:ext>
+    </p:extLst>
+  </p:cSld>
+  <p:clrMapOvr>
+    <a:masterClrMapping/>
+  </p:clrMapOvr>
+  <mc:AlternateContent xmlns:mc="http://schemas.openxmlformats.org/markup-compatibility/2006">
+    <mc:Choice xmlns:p14="http://schemas.microsoft.com/office/powerpoint/2010/main" Requires="p14">
+      <p:transition spd="slow" p14:dur="3000">
+        <p14:reveal/>
+      </p:transition>
+    </mc:Choice>
+    <mc:Fallback>
+      <p:transition spd="slow">
+        <p:fade/>
+      </p:transition>
+    </mc:Fallback>
+  </mc:AlternateContent>
+  <p:timing>
+    <p:tnLst>
+      <p:par>
+        <p:cTn id="1" dur="indefinite" restart="never" nodeType="tmRoot"/>
+      </p:par>
+    </p:tnLst>
+  </p:timing>
+</p:sld>
+</file>
+
+<file path=ppt/slides/slide22.xml><?xml version="1.0" encoding="utf-8"?>
+<p:sld xmlns:a="http://schemas.openxmlformats.org/drawingml/2006/main" xmlns:r="http://schemas.openxmlformats.org/officeDocument/2006/relationships" xmlns:p="http://schemas.openxmlformats.org/presentationml/2006/main">
+  <p:cSld>
+    <p:spTree>
+      <p:nvGrpSpPr>
+        <p:cNvPr id="1" name=""/>
+        <p:cNvGrpSpPr/>
+        <p:nvPr/>
+      </p:nvGrpSpPr>
+      <p:grpSpPr>
+        <a:xfrm>
+          <a:off x="0" y="0"/>
+          <a:ext cx="0" cy="0"/>
+          <a:chOff x="0" y="0"/>
+          <a:chExt cx="0" cy="0"/>
+        </a:xfrm>
+      </p:grpSpPr>
+      <p:pic>
+        <p:nvPicPr>
+          <p:cNvPr id="4" name="Picture 5"/>
+          <p:cNvPicPr>
+            <a:picLocks noGrp="1"/>
+          </p:cNvPicPr>
+          <p:nvPr>
+            <p:ph idx="1"/>
+          </p:nvPr>
+        </p:nvPicPr>
+        <p:blipFill>
+          <a:blip r:embed="rId2" cstate="print"/>
+          <a:srcRect/>
+          <a:stretch>
+            <a:fillRect/>
+          </a:stretch>
+        </p:blipFill>
+        <p:spPr bwMode="auto">
+          <a:xfrm>
+            <a:off x="631065" y="286604"/>
+            <a:ext cx="10599311" cy="5985408"/>
+          </a:xfrm>
+          <a:prstGeom prst="rect">
+            <a:avLst/>
+          </a:prstGeom>
+          <a:noFill/>
+          <a:ln w="9525">
+            <a:noFill/>
+            <a:miter lim="800000"/>
+            <a:headEnd/>
+            <a:tailEnd/>
+          </a:ln>
+        </p:spPr>
+      </p:pic>
+    </p:spTree>
+    <p:extLst>
+      <p:ext uri="{BB962C8B-B14F-4D97-AF65-F5344CB8AC3E}">
+        <p14:creationId xmlns:p14="http://schemas.microsoft.com/office/powerpoint/2010/main" val="2365223657"/>
+      </p:ext>
+    </p:extLst>
+  </p:cSld>
+  <p:clrMapOvr>
+    <a:masterClrMapping/>
+  </p:clrMapOvr>
+  <mc:AlternateContent xmlns:mc="http://schemas.openxmlformats.org/markup-compatibility/2006">
+    <mc:Choice xmlns:p14="http://schemas.microsoft.com/office/powerpoint/2010/main" Requires="p14">
+      <p:transition spd="slow" p14:dur="3000">
+        <p14:reveal/>
+      </p:transition>
+    </mc:Choice>
+    <mc:Fallback>
+      <p:transition spd="slow">
+        <p:fade/>
+      </p:transition>
+    </mc:Fallback>
+  </mc:AlternateContent>
+  <p:timing>
+    <p:tnLst>
+      <p:par>
+        <p:cTn id="1" dur="indefinite" restart="never" nodeType="tmRoot"/>
+      </p:par>
+    </p:tnLst>
+  </p:timing>
+</p:sld>
+</file>
+
+<file path=ppt/slides/slide23.xml><?xml version="1.0" encoding="utf-8"?>
+<p:sld xmlns:a="http://schemas.openxmlformats.org/drawingml/2006/main" xmlns:r="http://schemas.openxmlformats.org/officeDocument/2006/relationships" xmlns:p="http://schemas.openxmlformats.org/presentationml/2006/main">
+  <p:cSld>
+    <p:spTree>
+      <p:nvGrpSpPr>
+        <p:cNvPr id="1" name=""/>
+        <p:cNvGrpSpPr/>
+        <p:nvPr/>
+      </p:nvGrpSpPr>
+      <p:grpSpPr>
+        <a:xfrm>
+          <a:off x="0" y="0"/>
+          <a:ext cx="0" cy="0"/>
+          <a:chOff x="0" y="0"/>
+          <a:chExt cx="0" cy="0"/>
+        </a:xfrm>
+      </p:grpSpPr>
+      <p:pic>
+        <p:nvPicPr>
+          <p:cNvPr id="4" name="Picture 6"/>
+          <p:cNvPicPr>
+            <a:picLocks noGrp="1"/>
+          </p:cNvPicPr>
+          <p:nvPr>
+            <p:ph idx="1"/>
+          </p:nvPr>
+        </p:nvPicPr>
+        <p:blipFill>
+          <a:blip r:embed="rId2" cstate="print"/>
+          <a:srcRect/>
+          <a:stretch>
+            <a:fillRect/>
+          </a:stretch>
+        </p:blipFill>
+        <p:spPr bwMode="auto">
+          <a:xfrm>
+            <a:off x="605308" y="206062"/>
+            <a:ext cx="11178861" cy="6091707"/>
+          </a:xfrm>
+          <a:prstGeom prst="rect">
+            <a:avLst/>
+          </a:prstGeom>
+          <a:noFill/>
+          <a:ln w="9525">
+            <a:noFill/>
+            <a:miter lim="800000"/>
+            <a:headEnd/>
+            <a:tailEnd/>
+          </a:ln>
+        </p:spPr>
+      </p:pic>
+    </p:spTree>
+    <p:extLst>
+      <p:ext uri="{BB962C8B-B14F-4D97-AF65-F5344CB8AC3E}">
+        <p14:creationId xmlns:p14="http://schemas.microsoft.com/office/powerpoint/2010/main" val="177000561"/>
+      </p:ext>
+    </p:extLst>
+  </p:cSld>
+  <p:clrMapOvr>
+    <a:masterClrMapping/>
+  </p:clrMapOvr>
+  <mc:AlternateContent xmlns:mc="http://schemas.openxmlformats.org/markup-compatibility/2006">
+    <mc:Choice xmlns:p14="http://schemas.microsoft.com/office/powerpoint/2010/main" Requires="p14">
+      <p:transition spd="slow" p14:dur="3000">
+        <p14:reveal/>
+      </p:transition>
+    </mc:Choice>
+    <mc:Fallback>
+      <p:transition spd="slow">
+        <p:fade/>
+      </p:transition>
+    </mc:Fallback>
+  </mc:AlternateContent>
+  <p:timing>
+    <p:tnLst>
+      <p:par>
+        <p:cTn id="1" dur="indefinite" restart="never" nodeType="tmRoot"/>
+      </p:par>
+    </p:tnLst>
+  </p:timing>
+</p:sld>
+</file>
+
+<file path=ppt/slides/slide24.xml><?xml version="1.0" encoding="utf-8"?>
+<p:sld xmlns:a="http://schemas.openxmlformats.org/drawingml/2006/main" xmlns:r="http://schemas.openxmlformats.org/officeDocument/2006/relationships" xmlns:p="http://schemas.openxmlformats.org/presentationml/2006/main">
+  <p:cSld>
+    <p:spTree>
+      <p:nvGrpSpPr>
+        <p:cNvPr id="1" name=""/>
+        <p:cNvGrpSpPr/>
+        <p:nvPr/>
+      </p:nvGrpSpPr>
+      <p:grpSpPr>
+        <a:xfrm>
+          <a:off x="0" y="0"/>
+          <a:ext cx="0" cy="0"/>
+          <a:chOff x="0" y="0"/>
+          <a:chExt cx="0" cy="0"/>
+        </a:xfrm>
+      </p:grpSpPr>
+      <p:pic>
+        <p:nvPicPr>
+          <p:cNvPr id="5" name="Picture 7"/>
+          <p:cNvPicPr>
+            <a:picLocks noGrp="1"/>
+          </p:cNvPicPr>
+          <p:nvPr>
+            <p:ph idx="1"/>
+          </p:nvPr>
+        </p:nvPicPr>
+        <p:blipFill>
+          <a:blip r:embed="rId2" cstate="print"/>
+          <a:srcRect/>
+          <a:stretch>
+            <a:fillRect/>
+          </a:stretch>
+        </p:blipFill>
+        <p:spPr bwMode="auto">
+          <a:xfrm>
+            <a:off x="695460" y="553792"/>
+            <a:ext cx="10578020" cy="5666703"/>
+          </a:xfrm>
+          <a:prstGeom prst="rect">
+            <a:avLst/>
+          </a:prstGeom>
+          <a:noFill/>
+          <a:ln w="9525">
+            <a:noFill/>
+            <a:miter lim="800000"/>
+            <a:headEnd/>
+            <a:tailEnd/>
+          </a:ln>
+        </p:spPr>
+      </p:pic>
+    </p:spTree>
+    <p:extLst>
+      <p:ext uri="{BB962C8B-B14F-4D97-AF65-F5344CB8AC3E}">
+        <p14:creationId xmlns:p14="http://schemas.microsoft.com/office/powerpoint/2010/main" val="1572752384"/>
+      </p:ext>
+    </p:extLst>
+  </p:cSld>
+  <p:clrMapOvr>
+    <a:masterClrMapping/>
+  </p:clrMapOvr>
+  <mc:AlternateContent xmlns:mc="http://schemas.openxmlformats.org/markup-compatibility/2006">
+    <mc:Choice xmlns:p14="http://schemas.microsoft.com/office/powerpoint/2010/main" Requires="p14">
+      <p:transition spd="slow" p14:dur="3000">
+        <p14:reveal/>
+      </p:transition>
+    </mc:Choice>
+    <mc:Fallback>
+      <p:transition spd="slow">
+        <p:fade/>
+      </p:transition>
+    </mc:Fallback>
+  </mc:AlternateContent>
+  <p:timing>
+    <p:tnLst>
+      <p:par>
+        <p:cTn id="1" dur="indefinite" restart="never" nodeType="tmRoot"/>
+      </p:par>
+    </p:tnLst>
+  </p:timing>
+</p:sld>
+</file>
+
+<file path=ppt/slides/slide25.xml><?xml version="1.0" encoding="utf-8"?>
+<p:sld xmlns:a="http://schemas.openxmlformats.org/drawingml/2006/main" xmlns:r="http://schemas.openxmlformats.org/officeDocument/2006/relationships" xmlns:p="http://schemas.openxmlformats.org/presentationml/2006/main">
+  <p:cSld>
+    <p:spTree>
+      <p:nvGrpSpPr>
+        <p:cNvPr id="1" name=""/>
+        <p:cNvGrpSpPr/>
+        <p:nvPr/>
+      </p:nvGrpSpPr>
+      <p:grpSpPr>
+        <a:xfrm>
+          <a:off x="0" y="0"/>
+          <a:ext cx="0" cy="0"/>
+          <a:chOff x="0" y="0"/>
+          <a:chExt cx="0" cy="0"/>
+        </a:xfrm>
+      </p:grpSpPr>
+      <p:pic>
+        <p:nvPicPr>
+          <p:cNvPr id="4" name="Picture 8"/>
+          <p:cNvPicPr>
+            <a:picLocks noGrp="1"/>
+          </p:cNvPicPr>
+          <p:nvPr>
+            <p:ph idx="1"/>
+          </p:nvPr>
+        </p:nvPicPr>
+        <p:blipFill>
+          <a:blip r:embed="rId2" cstate="print"/>
+          <a:srcRect/>
+          <a:stretch>
+            <a:fillRect/>
+          </a:stretch>
+        </p:blipFill>
+        <p:spPr bwMode="auto">
+          <a:xfrm>
+            <a:off x="641651" y="294926"/>
+            <a:ext cx="10588726" cy="5809660"/>
+          </a:xfrm>
+          <a:prstGeom prst="rect">
+            <a:avLst/>
+          </a:prstGeom>
+          <a:noFill/>
+          <a:ln w="9525">
+            <a:noFill/>
+            <a:miter lim="800000"/>
+            <a:headEnd/>
+            <a:tailEnd/>
+          </a:ln>
+        </p:spPr>
+      </p:pic>
+    </p:spTree>
+    <p:extLst>
+      <p:ext uri="{BB962C8B-B14F-4D97-AF65-F5344CB8AC3E}">
+        <p14:creationId xmlns:p14="http://schemas.microsoft.com/office/powerpoint/2010/main" val="2033898408"/>
+      </p:ext>
+    </p:extLst>
+  </p:cSld>
+  <p:clrMapOvr>
+    <a:masterClrMapping/>
+  </p:clrMapOvr>
+  <mc:AlternateContent xmlns:mc="http://schemas.openxmlformats.org/markup-compatibility/2006">
+    <mc:Choice xmlns:p14="http://schemas.microsoft.com/office/powerpoint/2010/main" Requires="p14">
+      <p:transition spd="slow" p14:dur="3000">
+        <p14:reveal/>
+      </p:transition>
+    </mc:Choice>
+    <mc:Fallback>
+      <p:transition spd="slow">
+        <p:fade/>
+      </p:transition>
+    </mc:Fallback>
+  </mc:AlternateContent>
+  <p:timing>
+    <p:tnLst>
+      <p:par>
+        <p:cTn id="1" dur="indefinite" restart="never" nodeType="tmRoot"/>
+      </p:par>
+    </p:tnLst>
+  </p:timing>
+</p:sld>
+</file>
+
+<file path=ppt/slides/slide26.xml><?xml version="1.0" encoding="utf-8"?>
+<p:sld xmlns:a="http://schemas.openxmlformats.org/drawingml/2006/main" xmlns:r="http://schemas.openxmlformats.org/officeDocument/2006/relationships" xmlns:p="http://schemas.openxmlformats.org/presentationml/2006/main">
+  <p:cSld>
+    <p:spTree>
+      <p:nvGrpSpPr>
+        <p:cNvPr id="1" name=""/>
+        <p:cNvGrpSpPr/>
+        <p:nvPr/>
+      </p:nvGrpSpPr>
+      <p:grpSpPr>
+        <a:xfrm>
+          <a:off x="0" y="0"/>
+          <a:ext cx="0" cy="0"/>
+          <a:chOff x="0" y="0"/>
+          <a:chExt cx="0" cy="0"/>
+        </a:xfrm>
+      </p:grpSpPr>
+      <p:sp>
+        <p:nvSpPr>
+          <p:cNvPr id="3" name="Espace réservé du contenu 2"/>
+          <p:cNvSpPr>
+            <a:spLocks noGrp="1"/>
+          </p:cNvSpPr>
+          <p:nvPr>
+            <p:ph idx="1"/>
+          </p:nvPr>
+        </p:nvSpPr>
+        <p:spPr/>
+        <p:txBody>
+          <a:bodyPr/>
+          <a:lstStyle/>
+          <a:p>
+            <a:endParaRPr lang="fr-FR"/>
+          </a:p>
+        </p:txBody>
+      </p:sp>
+      <p:pic>
+        <p:nvPicPr>
+          <p:cNvPr id="4" name="Picture 9"/>
+          <p:cNvPicPr/>
+          <p:nvPr/>
+        </p:nvPicPr>
+        <p:blipFill>
+          <a:blip r:embed="rId2" cstate="print"/>
+          <a:srcRect/>
+          <a:stretch>
+            <a:fillRect/>
+          </a:stretch>
+        </p:blipFill>
+        <p:spPr bwMode="auto">
+          <a:xfrm>
+            <a:off x="592429" y="464314"/>
+            <a:ext cx="10792496" cy="5678909"/>
+          </a:xfrm>
+          <a:prstGeom prst="rect">
+            <a:avLst/>
+          </a:prstGeom>
+          <a:noFill/>
+          <a:ln w="9525">
+            <a:noFill/>
+            <a:miter lim="800000"/>
+            <a:headEnd/>
+            <a:tailEnd/>
+          </a:ln>
+        </p:spPr>
+      </p:pic>
+    </p:spTree>
+    <p:extLst>
+      <p:ext uri="{BB962C8B-B14F-4D97-AF65-F5344CB8AC3E}">
+        <p14:creationId xmlns:p14="http://schemas.microsoft.com/office/powerpoint/2010/main" val="3911782098"/>
+      </p:ext>
+    </p:extLst>
+  </p:cSld>
+  <p:clrMapOvr>
+    <a:masterClrMapping/>
+  </p:clrMapOvr>
+  <mc:AlternateContent xmlns:mc="http://schemas.openxmlformats.org/markup-compatibility/2006">
+    <mc:Choice xmlns:p14="http://schemas.microsoft.com/office/powerpoint/2010/main" Requires="p14">
+      <p:transition spd="slow" p14:dur="3000">
+        <p14:reveal/>
+      </p:transition>
+    </mc:Choice>
+    <mc:Fallback>
+      <p:transition spd="slow">
+        <p:fade/>
+      </p:transition>
+    </mc:Fallback>
+  </mc:AlternateContent>
+  <p:timing>
+    <p:tnLst>
+      <p:par>
+        <p:cTn id="1" dur="indefinite" restart="never" nodeType="tmRoot"/>
+      </p:par>
+    </p:tnLst>
+  </p:timing>
+</p:sld>
+</file>
+
+<file path=ppt/slides/slide27.xml><?xml version="1.0" encoding="utf-8"?>
+<p:sld xmlns:a="http://schemas.openxmlformats.org/drawingml/2006/main" xmlns:r="http://schemas.openxmlformats.org/officeDocument/2006/relationships" xmlns:p="http://schemas.openxmlformats.org/presentationml/2006/main">
+  <p:cSld>
+    <p:spTree>
+      <p:nvGrpSpPr>
+        <p:cNvPr id="1" name=""/>
+        <p:cNvGrpSpPr/>
+        <p:nvPr/>
+      </p:nvGrpSpPr>
+      <p:grpSpPr>
+        <a:xfrm>
+          <a:off x="0" y="0"/>
+          <a:ext cx="0" cy="0"/>
+          <a:chOff x="0" y="0"/>
+          <a:chExt cx="0" cy="0"/>
+        </a:xfrm>
+      </p:grpSpPr>
+      <p:sp>
+        <p:nvSpPr>
+          <p:cNvPr id="2" name="Titre 1"/>
+          <p:cNvSpPr>
+            <a:spLocks noGrp="1"/>
+          </p:cNvSpPr>
+          <p:nvPr>
+            <p:ph type="title"/>
+          </p:nvPr>
+        </p:nvSpPr>
+        <p:spPr/>
+        <p:txBody>
+          <a:bodyPr/>
+          <a:lstStyle/>
+          <a:p>
+            <a:r>
+              <a:rPr lang="fr-FR" sz="3200" b="1" cap="small" dirty="0"/>
+              <a:t>- </a:t>
+            </a:r>
+            <a:r>
+              <a:rPr lang="fr-FR" sz="3200" b="1" cap="small" dirty="0" err="1"/>
+              <a:t>TestVariable</a:t>
+            </a:r>
+            <a:r>
+              <a:rPr lang="fr-FR" sz="3200" b="1" cap="small" dirty="0"/>
+              <a:t> :</a:t>
+            </a:r>
+            <a:r>
+              <a:rPr lang="fr-FR" b="1" cap="small" dirty="0"/>
+              <a:t/>
+            </a:r>
+            <a:br>
+              <a:rPr lang="fr-FR" b="1" cap="small" dirty="0"/>
+            </a:br>
+            <a:endParaRPr lang="fr-FR" dirty="0"/>
+          </a:p>
+        </p:txBody>
+      </p:sp>
+      <p:pic>
+        <p:nvPicPr>
+          <p:cNvPr id="4" name="Picture 11"/>
+          <p:cNvPicPr>
+            <a:picLocks noGrp="1"/>
+          </p:cNvPicPr>
+          <p:nvPr>
+            <p:ph idx="1"/>
+          </p:nvPr>
+        </p:nvPicPr>
+        <p:blipFill>
+          <a:blip r:embed="rId2" cstate="print"/>
+          <a:srcRect/>
+          <a:stretch>
+            <a:fillRect/>
+          </a:stretch>
+        </p:blipFill>
+        <p:spPr bwMode="auto">
+          <a:xfrm>
+            <a:off x="908389" y="1531298"/>
+            <a:ext cx="10058400" cy="4483136"/>
+          </a:xfrm>
+          <a:prstGeom prst="rect">
+            <a:avLst/>
+          </a:prstGeom>
+          <a:noFill/>
+          <a:ln w="9525">
+            <a:noFill/>
+            <a:miter lim="800000"/>
+            <a:headEnd/>
+            <a:tailEnd/>
+          </a:ln>
+        </p:spPr>
+      </p:pic>
+    </p:spTree>
+    <p:extLst>
+      <p:ext uri="{BB962C8B-B14F-4D97-AF65-F5344CB8AC3E}">
+        <p14:creationId xmlns:p14="http://schemas.microsoft.com/office/powerpoint/2010/main" val="2404473533"/>
+      </p:ext>
+    </p:extLst>
+  </p:cSld>
+  <p:clrMapOvr>
+    <a:masterClrMapping/>
+  </p:clrMapOvr>
+  <mc:AlternateContent xmlns:mc="http://schemas.openxmlformats.org/markup-compatibility/2006">
+    <mc:Choice xmlns:p14="http://schemas.microsoft.com/office/powerpoint/2010/main" Requires="p14">
+      <p:transition spd="slow" p14:dur="3000">
+        <p14:reveal/>
+      </p:transition>
+    </mc:Choice>
+    <mc:Fallback>
+      <p:transition spd="slow">
+        <p:fade/>
+      </p:transition>
+    </mc:Fallback>
+  </mc:AlternateContent>
+  <p:timing>
+    <p:tnLst>
+      <p:par>
+        <p:cTn id="1" dur="indefinite" restart="never" nodeType="tmRoot"/>
+      </p:par>
+    </p:tnLst>
+  </p:timing>
+</p:sld>
+</file>
+
+<file path=ppt/slides/slide28.xml><?xml version="1.0" encoding="utf-8"?>
+<p:sld xmlns:a="http://schemas.openxmlformats.org/drawingml/2006/main" xmlns:r="http://schemas.openxmlformats.org/officeDocument/2006/relationships" xmlns:p="http://schemas.openxmlformats.org/presentationml/2006/main">
+  <p:cSld>
+    <p:spTree>
+      <p:nvGrpSpPr>
+        <p:cNvPr id="1" name=""/>
+        <p:cNvGrpSpPr/>
+        <p:nvPr/>
+      </p:nvGrpSpPr>
+      <p:grpSpPr>
+        <a:xfrm>
+          <a:off x="0" y="0"/>
+          <a:ext cx="0" cy="0"/>
+          <a:chOff x="0" y="0"/>
+          <a:chExt cx="0" cy="0"/>
+        </a:xfrm>
+      </p:grpSpPr>
+      <p:sp>
+        <p:nvSpPr>
+          <p:cNvPr id="2" name="Titre 1"/>
+          <p:cNvSpPr>
+            <a:spLocks noGrp="1"/>
+          </p:cNvSpPr>
+          <p:nvPr>
+            <p:ph type="title"/>
+          </p:nvPr>
+        </p:nvSpPr>
+        <p:spPr/>
+        <p:txBody>
+          <a:bodyPr/>
+          <a:lstStyle/>
+          <a:p>
+            <a:r>
+              <a:rPr lang="fr-FR" dirty="0" smtClean="0">
+                <a:solidFill>
+                  <a:srgbClr val="BD582C">
+                    <a:lumMod val="75000"/>
+                  </a:srgbClr>
+                </a:solidFill>
+              </a:rPr>
+              <a:t>E. Tests</a:t>
+            </a:r>
+            <a:endParaRPr lang="fr-FR" dirty="0"/>
+          </a:p>
+        </p:txBody>
+      </p:sp>
+      <p:sp>
+        <p:nvSpPr>
+          <p:cNvPr id="3" name="Espace réservé du contenu 2"/>
+          <p:cNvSpPr>
+            <a:spLocks noGrp="1"/>
+          </p:cNvSpPr>
+          <p:nvPr>
+            <p:ph idx="1"/>
+          </p:nvPr>
+        </p:nvSpPr>
+        <p:spPr/>
+        <p:txBody>
+          <a:bodyPr/>
+          <a:lstStyle/>
+          <a:p>
+            <a:pPr marL="566928" lvl="3" indent="0">
+              <a:buNone/>
+            </a:pPr>
+            <a:r>
+              <a:rPr lang="fr-FR" sz="3200" dirty="0" smtClean="0">
+                <a:solidFill>
+                  <a:srgbClr val="FFC000"/>
+                </a:solidFill>
+              </a:rPr>
+              <a:t>3) Scénarios de test</a:t>
+            </a:r>
+          </a:p>
+          <a:p>
+            <a:pPr marL="566928" lvl="3" indent="0">
+              <a:buNone/>
+            </a:pPr>
+            <a:endParaRPr lang="fr-FR" sz="3200" dirty="0">
+              <a:solidFill>
+                <a:srgbClr val="FFC000"/>
+              </a:solidFill>
+            </a:endParaRPr>
+          </a:p>
+          <a:p>
+            <a:pPr marL="566928" lvl="3" indent="0">
+              <a:buNone/>
+            </a:pPr>
+            <a:r>
+              <a:rPr lang="fr-FR" sz="2400" b="1" dirty="0" smtClean="0">
+                <a:solidFill>
+                  <a:schemeClr val="tx1"/>
+                </a:solidFill>
+              </a:rPr>
+              <a:t>Partie Calculatrice :</a:t>
+            </a:r>
+          </a:p>
+          <a:p>
+            <a:pPr marL="566928" lvl="3" indent="0">
+              <a:buNone/>
+            </a:pPr>
+            <a:endParaRPr lang="fr-FR" sz="2400" b="1" dirty="0">
+              <a:solidFill>
+                <a:schemeClr val="tx1"/>
+              </a:solidFill>
+            </a:endParaRPr>
+          </a:p>
+          <a:p>
+            <a:pPr marL="566928" lvl="3" indent="0">
+              <a:buNone/>
+            </a:pPr>
+            <a:endParaRPr lang="fr-FR" sz="2400" b="1" dirty="0" smtClean="0">
+              <a:solidFill>
+                <a:schemeClr val="tx1"/>
+              </a:solidFill>
+            </a:endParaRPr>
+          </a:p>
+          <a:p>
+            <a:pPr marL="566928" lvl="3" indent="0">
+              <a:buNone/>
+            </a:pPr>
+            <a:endParaRPr lang="fr-FR" sz="2400" b="1" dirty="0">
+              <a:solidFill>
+                <a:schemeClr val="tx1"/>
+              </a:solidFill>
+            </a:endParaRPr>
+          </a:p>
+          <a:p>
+            <a:pPr marL="566928" lvl="3" indent="0">
+              <a:buNone/>
+            </a:pPr>
+            <a:r>
+              <a:rPr lang="fr-FR" sz="2400" b="1" dirty="0" smtClean="0">
+                <a:solidFill>
+                  <a:schemeClr val="tx1"/>
+                </a:solidFill>
+              </a:rPr>
+              <a:t>Partie Tableur :</a:t>
+            </a:r>
+            <a:endParaRPr lang="fr-FR" sz="2400" b="1" dirty="0">
+              <a:solidFill>
+                <a:schemeClr val="tx1"/>
+              </a:solidFill>
+            </a:endParaRPr>
+          </a:p>
+          <a:p>
+            <a:endParaRPr lang="fr-FR" dirty="0"/>
+          </a:p>
+        </p:txBody>
+      </p:sp>
+    </p:spTree>
+    <p:extLst>
+      <p:ext uri="{BB962C8B-B14F-4D97-AF65-F5344CB8AC3E}">
+        <p14:creationId xmlns:p14="http://schemas.microsoft.com/office/powerpoint/2010/main" val="3928213839"/>
+      </p:ext>
+    </p:extLst>
+  </p:cSld>
+  <p:clrMapOvr>
+    <a:masterClrMapping/>
+  </p:clrMapOvr>
+  <mc:AlternateContent xmlns:mc="http://schemas.openxmlformats.org/markup-compatibility/2006">
+    <mc:Choice xmlns:p14="http://schemas.microsoft.com/office/powerpoint/2010/main" Requires="p14">
+      <p:transition spd="slow" p14:dur="3000">
+        <p14:reveal/>
+      </p:transition>
+    </mc:Choice>
+    <mc:Fallback>
+      <p:transition spd="slow">
+        <p:fade/>
+      </p:transition>
+    </mc:Fallback>
+  </mc:AlternateContent>
+  <p:timing>
+    <p:tnLst>
+      <p:par>
+        <p:cTn id="1" dur="indefinite" restart="never" nodeType="tmRoot"/>
+      </p:par>
+    </p:tnLst>
+  </p:timing>
+</p:sld>
+</file>
+
+<file path=ppt/slides/slide29.xml><?xml version="1.0" encoding="utf-8"?>
+<p:sld xmlns:a="http://schemas.openxmlformats.org/drawingml/2006/main" xmlns:r="http://schemas.openxmlformats.org/officeDocument/2006/relationships" xmlns:p="http://schemas.openxmlformats.org/presentationml/2006/main">
+  <p:cSld>
+    <p:spTree>
+      <p:nvGrpSpPr>
+        <p:cNvPr id="1" name=""/>
+        <p:cNvGrpSpPr/>
+        <p:nvPr/>
+      </p:nvGrpSpPr>
+      <p:grpSpPr>
+        <a:xfrm>
+          <a:off x="0" y="0"/>
+          <a:ext cx="0" cy="0"/>
+          <a:chOff x="0" y="0"/>
+          <a:chExt cx="0" cy="0"/>
+        </a:xfrm>
+      </p:grpSpPr>
+      <p:sp>
+        <p:nvSpPr>
+          <p:cNvPr id="2" name="Titre 1"/>
+          <p:cNvSpPr>
+            <a:spLocks noGrp="1"/>
+          </p:cNvSpPr>
+          <p:nvPr>
+            <p:ph type="title"/>
+          </p:nvPr>
+        </p:nvSpPr>
+        <p:spPr/>
+        <p:txBody>
+          <a:bodyPr/>
+          <a:lstStyle/>
+          <a:p>
+            <a:r>
+              <a:rPr lang="fr-FR" dirty="0" smtClean="0">
+                <a:solidFill>
+                  <a:srgbClr val="BD582C">
+                    <a:lumMod val="75000"/>
+                  </a:srgbClr>
+                </a:solidFill>
+              </a:rPr>
+              <a:t>F. Bilan</a:t>
+            </a:r>
+            <a:endParaRPr lang="fr-FR" dirty="0"/>
+          </a:p>
+        </p:txBody>
+      </p:sp>
+      <p:sp>
+        <p:nvSpPr>
+          <p:cNvPr id="3" name="Espace réservé du contenu 2"/>
+          <p:cNvSpPr>
+            <a:spLocks noGrp="1"/>
+          </p:cNvSpPr>
+          <p:nvPr>
+            <p:ph idx="1"/>
+          </p:nvPr>
+        </p:nvSpPr>
+        <p:spPr/>
+        <p:txBody>
+          <a:bodyPr/>
+          <a:lstStyle/>
+          <a:p>
+            <a:pPr marL="91440" lvl="3" indent="-91440">
+              <a:spcBef>
+                <a:spcPts val="1200"/>
+              </a:spcBef>
+              <a:spcAft>
+                <a:spcPts val="200"/>
+              </a:spcAft>
+              <a:buSzPct val="100000"/>
+              <a:buFont typeface="Calibri" panose="020F0502020204030204" pitchFamily="34" charset="0"/>
+              <a:buChar char=" "/>
+            </a:pPr>
+            <a:endParaRPr lang="fr-FR" sz="3200" dirty="0">
+              <a:solidFill>
+                <a:srgbClr val="FFC000"/>
+              </a:solidFill>
+            </a:endParaRPr>
+          </a:p>
+          <a:p>
+            <a:pPr marL="91440" lvl="3" indent="-91440">
+              <a:spcBef>
+                <a:spcPts val="1200"/>
+              </a:spcBef>
+              <a:spcAft>
+                <a:spcPts val="200"/>
+              </a:spcAft>
+              <a:buSzPct val="100000"/>
+              <a:buFont typeface="Calibri" panose="020F0502020204030204" pitchFamily="34" charset="0"/>
+              <a:buChar char=" "/>
+            </a:pPr>
+            <a:r>
+              <a:rPr lang="fr-FR" sz="3200" dirty="0" smtClean="0">
+                <a:solidFill>
+                  <a:srgbClr val="FFC000"/>
+                </a:solidFill>
+              </a:rPr>
+              <a:t>Satisfaction des besoins</a:t>
+            </a:r>
+          </a:p>
+          <a:p>
+            <a:pPr marL="91440" lvl="3" indent="-91440">
+              <a:spcBef>
+                <a:spcPts val="1200"/>
+              </a:spcBef>
+              <a:spcAft>
+                <a:spcPts val="200"/>
+              </a:spcAft>
+              <a:buSzPct val="100000"/>
+              <a:buFont typeface="Calibri" panose="020F0502020204030204" pitchFamily="34" charset="0"/>
+              <a:buChar char=" "/>
+            </a:pPr>
+            <a:endParaRPr lang="fr-FR" sz="3200" dirty="0">
+              <a:solidFill>
+                <a:srgbClr val="FFC000"/>
+              </a:solidFill>
+            </a:endParaRPr>
+          </a:p>
+          <a:p>
+            <a:pPr marL="91440" lvl="3" indent="-91440">
+              <a:spcBef>
+                <a:spcPts val="1200"/>
+              </a:spcBef>
+              <a:spcAft>
+                <a:spcPts val="200"/>
+              </a:spcAft>
+              <a:buSzPct val="100000"/>
+              <a:buFont typeface="Calibri" panose="020F0502020204030204" pitchFamily="34" charset="0"/>
+              <a:buChar char=" "/>
+            </a:pPr>
+            <a:r>
+              <a:rPr lang="fr-FR" sz="3200" dirty="0" smtClean="0">
+                <a:solidFill>
+                  <a:srgbClr val="FFC000"/>
+                </a:solidFill>
+              </a:rPr>
+              <a:t>Bilan de la gestion de projet </a:t>
+            </a:r>
+            <a:endParaRPr lang="fr-FR" sz="3200" dirty="0">
+              <a:solidFill>
+                <a:srgbClr val="FFC000"/>
+              </a:solidFill>
+            </a:endParaRPr>
+          </a:p>
+          <a:p>
+            <a:endParaRPr lang="fr-FR" dirty="0"/>
+          </a:p>
+        </p:txBody>
+      </p:sp>
+    </p:spTree>
+    <p:extLst>
+      <p:ext uri="{BB962C8B-B14F-4D97-AF65-F5344CB8AC3E}">
+        <p14:creationId xmlns:p14="http://schemas.microsoft.com/office/powerpoint/2010/main" val="1235043849"/>
+      </p:ext>
+    </p:extLst>
+  </p:cSld>
+  <p:clrMapOvr>
+    <a:masterClrMapping/>
+  </p:clrMapOvr>
+  <mc:AlternateContent xmlns:mc="http://schemas.openxmlformats.org/markup-compatibility/2006">
+    <mc:Choice xmlns:p14="http://schemas.microsoft.com/office/powerpoint/2010/main" Requires="p14">
+      <p:transition spd="slow" p14:dur="3000">
+        <p14:reveal/>
+      </p:transition>
+    </mc:Choice>
+    <mc:Fallback>
       <p:transition spd="slow">
         <p:fade/>
       </p:transition>

</xml_diff>

<commit_message>
Réduction du temps des transitions
</commit_message>
<xml_diff>
--- a/ProjetS2/PresentationProjetS2.pptx
+++ b/ProjetS2/PresentationProjetS2.pptx
@@ -1,6 +1,6 @@
 
 <file path=ppt/presentation.xml><?xml version="1.0" encoding="utf-8"?>
-<p:presentation xmlns:a="http://schemas.openxmlformats.org/drawingml/2006/main" xmlns:r="http://schemas.openxmlformats.org/officeDocument/2006/relationships" xmlns:p="http://schemas.openxmlformats.org/presentationml/2006/main" saveSubsetFonts="1">
+<p:presentation xmlns:a="http://schemas.openxmlformats.org/drawingml/2006/main" xmlns:r="http://schemas.openxmlformats.org/officeDocument/2006/relationships" xmlns:p="http://schemas.openxmlformats.org/presentationml/2006/main" serverZoom="49592" saveSubsetFonts="1">
   <p:sldMasterIdLst>
     <p:sldMasterId id="2147483678" r:id="rId1"/>
   </p:sldMasterIdLst>
@@ -134,7 +134,7 @@
   </p:defaultTextStyle>
   <p:extLst>
     <p:ext uri="{EFAFB233-063F-42B5-8137-9DF3F51BA10A}">
-      <p15:sldGuideLst xmlns:p15="http://schemas.microsoft.com/office/powerpoint/2012/main">
+      <p15:sldGuideLst xmlns:p15="http://schemas.microsoft.com/office/powerpoint/2012/main" xmlns="">
         <p15:guide id="1" orient="horz" pos="2160" userDrawn="1">
           <p15:clr>
             <a:srgbClr val="A4A3A4"/>
@@ -419,7 +419,7 @@
           <a:p>
             <a:fld id="{B4E1FA03-DE6C-41FB-B508-C0E99749F86B}" type="slidenum">
               <a:rPr lang="fr-FR" smtClean="0"/>
-              <a:t>‹N°›</a:t>
+              <a:t>‹#›</a:t>
             </a:fld>
             <a:endParaRPr lang="fr-FR"/>
           </a:p>
@@ -473,13 +473,13 @@
   <p:clrMapOvr>
     <a:masterClrMapping/>
   </p:clrMapOvr>
-  <mc:AlternateContent xmlns:mc="http://schemas.openxmlformats.org/markup-compatibility/2006" xmlns:p14="http://schemas.microsoft.com/office/powerpoint/2010/main">
-    <mc:Choice Requires="p14">
-      <p:transition spd="slow" p14:dur="3000">
+  <mc:AlternateContent xmlns:mc="http://schemas.openxmlformats.org/markup-compatibility/2006">
+    <mc:Choice xmlns:p14="http://schemas.microsoft.com/office/powerpoint/2010/main" Requires="p14">
+      <p:transition spd="slow" p14:dur="1500">
         <p14:reveal/>
       </p:transition>
     </mc:Choice>
-    <mc:Fallback xmlns="">
+    <mc:Fallback>
       <p:transition spd="slow">
         <p:fade/>
       </p:transition>
@@ -639,7 +639,7 @@
           <a:p>
             <a:fld id="{B4E1FA03-DE6C-41FB-B508-C0E99749F86B}" type="slidenum">
               <a:rPr lang="fr-FR" smtClean="0"/>
-              <a:t>‹N°›</a:t>
+              <a:t>‹#›</a:t>
             </a:fld>
             <a:endParaRPr lang="fr-FR"/>
           </a:p>
@@ -655,13 +655,13 @@
   <p:clrMapOvr>
     <a:masterClrMapping/>
   </p:clrMapOvr>
-  <mc:AlternateContent xmlns:mc="http://schemas.openxmlformats.org/markup-compatibility/2006" xmlns:p14="http://schemas.microsoft.com/office/powerpoint/2010/main">
-    <mc:Choice Requires="p14">
-      <p:transition spd="slow" p14:dur="3000">
+  <mc:AlternateContent xmlns:mc="http://schemas.openxmlformats.org/markup-compatibility/2006">
+    <mc:Choice xmlns:p14="http://schemas.microsoft.com/office/powerpoint/2010/main" Requires="p14">
+      <p:transition spd="slow" p14:dur="1500">
         <p14:reveal/>
       </p:transition>
     </mc:Choice>
-    <mc:Fallback xmlns="">
+    <mc:Fallback>
       <p:transition spd="slow">
         <p:fade/>
       </p:transition>
@@ -907,7 +907,7 @@
           <a:p>
             <a:fld id="{B4E1FA03-DE6C-41FB-B508-C0E99749F86B}" type="slidenum">
               <a:rPr lang="fr-FR" smtClean="0"/>
-              <a:t>‹N°›</a:t>
+              <a:t>‹#›</a:t>
             </a:fld>
             <a:endParaRPr lang="fr-FR"/>
           </a:p>
@@ -923,13 +923,13 @@
   <p:clrMapOvr>
     <a:masterClrMapping/>
   </p:clrMapOvr>
-  <mc:AlternateContent xmlns:mc="http://schemas.openxmlformats.org/markup-compatibility/2006" xmlns:p14="http://schemas.microsoft.com/office/powerpoint/2010/main">
-    <mc:Choice Requires="p14">
-      <p:transition spd="slow" p14:dur="3000">
+  <mc:AlternateContent xmlns:mc="http://schemas.openxmlformats.org/markup-compatibility/2006">
+    <mc:Choice xmlns:p14="http://schemas.microsoft.com/office/powerpoint/2010/main" Requires="p14">
+      <p:transition spd="slow" p14:dur="1500">
         <p14:reveal/>
       </p:transition>
     </mc:Choice>
-    <mc:Fallback xmlns="">
+    <mc:Fallback>
       <p:transition spd="slow">
         <p:fade/>
       </p:transition>
@@ -1093,7 +1093,7 @@
           <a:p>
             <a:fld id="{B4E1FA03-DE6C-41FB-B508-C0E99749F86B}" type="slidenum">
               <a:rPr lang="fr-FR" smtClean="0"/>
-              <a:t>‹N°›</a:t>
+              <a:t>‹#›</a:t>
             </a:fld>
             <a:endParaRPr lang="fr-FR"/>
           </a:p>
@@ -1109,13 +1109,13 @@
   <p:clrMapOvr>
     <a:masterClrMapping/>
   </p:clrMapOvr>
-  <mc:AlternateContent xmlns:mc="http://schemas.openxmlformats.org/markup-compatibility/2006" xmlns:p14="http://schemas.microsoft.com/office/powerpoint/2010/main">
-    <mc:Choice Requires="p14">
-      <p:transition spd="slow" p14:dur="3000">
+  <mc:AlternateContent xmlns:mc="http://schemas.openxmlformats.org/markup-compatibility/2006">
+    <mc:Choice xmlns:p14="http://schemas.microsoft.com/office/powerpoint/2010/main" Requires="p14">
+      <p:transition spd="slow" p14:dur="1500">
         <p14:reveal/>
       </p:transition>
     </mc:Choice>
-    <mc:Fallback xmlns="">
+    <mc:Fallback>
       <p:transition spd="slow">
         <p:fade/>
       </p:transition>
@@ -1448,7 +1448,7 @@
           <a:p>
             <a:fld id="{B4E1FA03-DE6C-41FB-B508-C0E99749F86B}" type="slidenum">
               <a:rPr lang="fr-FR" smtClean="0"/>
-              <a:t>‹N°›</a:t>
+              <a:t>‹#›</a:t>
             </a:fld>
             <a:endParaRPr lang="fr-FR"/>
           </a:p>
@@ -1502,13 +1502,13 @@
   <p:clrMapOvr>
     <a:masterClrMapping/>
   </p:clrMapOvr>
-  <mc:AlternateContent xmlns:mc="http://schemas.openxmlformats.org/markup-compatibility/2006" xmlns:p14="http://schemas.microsoft.com/office/powerpoint/2010/main">
-    <mc:Choice Requires="p14">
-      <p:transition spd="slow" p14:dur="3000">
+  <mc:AlternateContent xmlns:mc="http://schemas.openxmlformats.org/markup-compatibility/2006">
+    <mc:Choice xmlns:p14="http://schemas.microsoft.com/office/powerpoint/2010/main" Requires="p14">
+      <p:transition spd="slow" p14:dur="1500">
         <p14:reveal/>
       </p:transition>
     </mc:Choice>
-    <mc:Fallback xmlns="">
+    <mc:Fallback>
       <p:transition spd="slow">
         <p:fade/>
       </p:transition>
@@ -1735,7 +1735,7 @@
           <a:p>
             <a:fld id="{B4E1FA03-DE6C-41FB-B508-C0E99749F86B}" type="slidenum">
               <a:rPr lang="fr-FR" smtClean="0"/>
-              <a:t>‹N°›</a:t>
+              <a:t>‹#›</a:t>
             </a:fld>
             <a:endParaRPr lang="fr-FR"/>
           </a:p>
@@ -1751,13 +1751,13 @@
   <p:clrMapOvr>
     <a:masterClrMapping/>
   </p:clrMapOvr>
-  <mc:AlternateContent xmlns:mc="http://schemas.openxmlformats.org/markup-compatibility/2006" xmlns:p14="http://schemas.microsoft.com/office/powerpoint/2010/main">
-    <mc:Choice Requires="p14">
-      <p:transition spd="slow" p14:dur="3000">
+  <mc:AlternateContent xmlns:mc="http://schemas.openxmlformats.org/markup-compatibility/2006">
+    <mc:Choice xmlns:p14="http://schemas.microsoft.com/office/powerpoint/2010/main" Requires="p14">
+      <p:transition spd="slow" p14:dur="1500">
         <p14:reveal/>
       </p:transition>
     </mc:Choice>
-    <mc:Fallback xmlns="">
+    <mc:Fallback>
       <p:transition spd="slow">
         <p:fade/>
       </p:transition>
@@ -2126,7 +2126,7 @@
           <a:p>
             <a:fld id="{B4E1FA03-DE6C-41FB-B508-C0E99749F86B}" type="slidenum">
               <a:rPr lang="fr-FR" smtClean="0"/>
-              <a:t>‹N°›</a:t>
+              <a:t>‹#›</a:t>
             </a:fld>
             <a:endParaRPr lang="fr-FR"/>
           </a:p>
@@ -2142,13 +2142,13 @@
   <p:clrMapOvr>
     <a:masterClrMapping/>
   </p:clrMapOvr>
-  <mc:AlternateContent xmlns:mc="http://schemas.openxmlformats.org/markup-compatibility/2006" xmlns:p14="http://schemas.microsoft.com/office/powerpoint/2010/main">
-    <mc:Choice Requires="p14">
-      <p:transition spd="slow" p14:dur="3000">
+  <mc:AlternateContent xmlns:mc="http://schemas.openxmlformats.org/markup-compatibility/2006">
+    <mc:Choice xmlns:p14="http://schemas.microsoft.com/office/powerpoint/2010/main" Requires="p14">
+      <p:transition spd="slow" p14:dur="1500">
         <p14:reveal/>
       </p:transition>
     </mc:Choice>
-    <mc:Fallback xmlns="">
+    <mc:Fallback>
       <p:transition spd="slow">
         <p:fade/>
       </p:transition>
@@ -2256,7 +2256,7 @@
           <a:p>
             <a:fld id="{B4E1FA03-DE6C-41FB-B508-C0E99749F86B}" type="slidenum">
               <a:rPr lang="fr-FR" smtClean="0"/>
-              <a:t>‹N°›</a:t>
+              <a:t>‹#›</a:t>
             </a:fld>
             <a:endParaRPr lang="fr-FR"/>
           </a:p>
@@ -2272,13 +2272,13 @@
   <p:clrMapOvr>
     <a:masterClrMapping/>
   </p:clrMapOvr>
-  <mc:AlternateContent xmlns:mc="http://schemas.openxmlformats.org/markup-compatibility/2006" xmlns:p14="http://schemas.microsoft.com/office/powerpoint/2010/main">
-    <mc:Choice Requires="p14">
-      <p:transition spd="slow" p14:dur="3000">
+  <mc:AlternateContent xmlns:mc="http://schemas.openxmlformats.org/markup-compatibility/2006">
+    <mc:Choice xmlns:p14="http://schemas.microsoft.com/office/powerpoint/2010/main" Requires="p14">
+      <p:transition spd="slow" p14:dur="1500">
         <p14:reveal/>
       </p:transition>
     </mc:Choice>
-    <mc:Fallback xmlns="">
+    <mc:Fallback>
       <p:transition spd="slow">
         <p:fade/>
       </p:transition>
@@ -2447,7 +2447,7 @@
           <a:p>
             <a:fld id="{B4E1FA03-DE6C-41FB-B508-C0E99749F86B}" type="slidenum">
               <a:rPr lang="fr-FR" smtClean="0"/>
-              <a:t>‹N°›</a:t>
+              <a:t>‹#›</a:t>
             </a:fld>
             <a:endParaRPr lang="fr-FR"/>
           </a:p>
@@ -2463,13 +2463,13 @@
   <p:clrMapOvr>
     <a:masterClrMapping/>
   </p:clrMapOvr>
-  <mc:AlternateContent xmlns:mc="http://schemas.openxmlformats.org/markup-compatibility/2006" xmlns:p14="http://schemas.microsoft.com/office/powerpoint/2010/main">
-    <mc:Choice Requires="p14">
-      <p:transition spd="slow" p14:dur="3000">
+  <mc:AlternateContent xmlns:mc="http://schemas.openxmlformats.org/markup-compatibility/2006">
+    <mc:Choice xmlns:p14="http://schemas.microsoft.com/office/powerpoint/2010/main" Requires="p14">
+      <p:transition spd="slow" p14:dur="1500">
         <p14:reveal/>
       </p:transition>
     </mc:Choice>
-    <mc:Fallback xmlns="">
+    <mc:Fallback>
       <p:transition spd="slow">
         <p:fade/>
       </p:transition>
@@ -2826,7 +2826,7 @@
           <a:p>
             <a:fld id="{B4E1FA03-DE6C-41FB-B508-C0E99749F86B}" type="slidenum">
               <a:rPr lang="fr-FR" smtClean="0"/>
-              <a:t>‹N°›</a:t>
+              <a:t>‹#›</a:t>
             </a:fld>
             <a:endParaRPr lang="fr-FR"/>
           </a:p>
@@ -2842,13 +2842,13 @@
   <p:clrMapOvr>
     <a:masterClrMapping/>
   </p:clrMapOvr>
-  <mc:AlternateContent xmlns:mc="http://schemas.openxmlformats.org/markup-compatibility/2006" xmlns:p14="http://schemas.microsoft.com/office/powerpoint/2010/main">
-    <mc:Choice Requires="p14">
-      <p:transition spd="slow" p14:dur="3000">
+  <mc:AlternateContent xmlns:mc="http://schemas.openxmlformats.org/markup-compatibility/2006">
+    <mc:Choice xmlns:p14="http://schemas.microsoft.com/office/powerpoint/2010/main" Requires="p14">
+      <p:transition spd="slow" p14:dur="1500">
         <p14:reveal/>
       </p:transition>
     </mc:Choice>
-    <mc:Fallback xmlns="">
+    <mc:Fallback>
       <p:transition spd="slow">
         <p:fade/>
       </p:transition>
@@ -3199,7 +3199,7 @@
           <a:p>
             <a:fld id="{B4E1FA03-DE6C-41FB-B508-C0E99749F86B}" type="slidenum">
               <a:rPr lang="fr-FR" smtClean="0"/>
-              <a:t>‹N°›</a:t>
+              <a:t>‹#›</a:t>
             </a:fld>
             <a:endParaRPr lang="fr-FR"/>
           </a:p>
@@ -3215,13 +3215,13 @@
   <p:clrMapOvr>
     <a:masterClrMapping/>
   </p:clrMapOvr>
-  <mc:AlternateContent xmlns:mc="http://schemas.openxmlformats.org/markup-compatibility/2006" xmlns:p14="http://schemas.microsoft.com/office/powerpoint/2010/main">
-    <mc:Choice Requires="p14">
-      <p:transition spd="slow" p14:dur="3000">
+  <mc:AlternateContent xmlns:mc="http://schemas.openxmlformats.org/markup-compatibility/2006">
+    <mc:Choice xmlns:p14="http://schemas.microsoft.com/office/powerpoint/2010/main" Requires="p14">
+      <p:transition spd="slow" p14:dur="1500">
         <p14:reveal/>
       </p:transition>
     </mc:Choice>
-    <mc:Fallback xmlns="">
+    <mc:Fallback>
       <p:transition spd="slow">
         <p:fade/>
       </p:transition>
@@ -3530,7 +3530,7 @@
           <a:p>
             <a:fld id="{B4E1FA03-DE6C-41FB-B508-C0E99749F86B}" type="slidenum">
               <a:rPr lang="fr-FR" smtClean="0"/>
-              <a:t>‹N°›</a:t>
+              <a:t>‹#›</a:t>
             </a:fld>
             <a:endParaRPr lang="fr-FR"/>
           </a:p>
@@ -3595,13 +3595,13 @@
     <p:sldLayoutId id="2147483688" r:id="rId10"/>
     <p:sldLayoutId id="2147483689" r:id="rId11"/>
   </p:sldLayoutIdLst>
-  <mc:AlternateContent xmlns:mc="http://schemas.openxmlformats.org/markup-compatibility/2006" xmlns:p14="http://schemas.microsoft.com/office/powerpoint/2010/main">
-    <mc:Choice Requires="p14">
-      <p:transition spd="slow" p14:dur="3000">
+  <mc:AlternateContent xmlns:mc="http://schemas.openxmlformats.org/markup-compatibility/2006">
+    <mc:Choice xmlns:p14="http://schemas.microsoft.com/office/powerpoint/2010/main" Requires="p14">
+      <p:transition spd="slow" p14:dur="1500">
         <p14:reveal/>
       </p:transition>
     </mc:Choice>
-    <mc:Fallback xmlns="">
+    <mc:Fallback>
       <p:transition spd="slow">
         <p:fade/>
       </p:transition>
@@ -4168,13 +4168,13 @@
   <p:clrMapOvr>
     <a:masterClrMapping/>
   </p:clrMapOvr>
-  <mc:AlternateContent xmlns:mc="http://schemas.openxmlformats.org/markup-compatibility/2006" xmlns:p14="http://schemas.microsoft.com/office/powerpoint/2010/main">
-    <mc:Choice Requires="p14">
-      <p:transition spd="slow" p14:dur="3000">
+  <mc:AlternateContent xmlns:mc="http://schemas.openxmlformats.org/markup-compatibility/2006">
+    <mc:Choice xmlns:p14="http://schemas.microsoft.com/office/powerpoint/2010/main" Requires="p14">
+      <p:transition spd="slow" p14:dur="1500">
         <p14:reveal/>
       </p:transition>
     </mc:Choice>
-    <mc:Fallback xmlns="">
+    <mc:Fallback>
       <p:transition spd="slow">
         <p:fade/>
       </p:transition>
@@ -4542,13 +4542,13 @@
   <p:clrMapOvr>
     <a:masterClrMapping/>
   </p:clrMapOvr>
-  <mc:AlternateContent xmlns:mc="http://schemas.openxmlformats.org/markup-compatibility/2006" xmlns:p14="http://schemas.microsoft.com/office/powerpoint/2010/main">
-    <mc:Choice Requires="p14">
-      <p:transition spd="slow" p14:dur="3000">
+  <mc:AlternateContent xmlns:mc="http://schemas.openxmlformats.org/markup-compatibility/2006">
+    <mc:Choice xmlns:p14="http://schemas.microsoft.com/office/powerpoint/2010/main" Requires="p14">
+      <p:transition spd="slow" p14:dur="1500">
         <p14:reveal/>
       </p:transition>
     </mc:Choice>
-    <mc:Fallback xmlns="">
+    <mc:Fallback>
       <p:transition spd="slow">
         <p:fade/>
       </p:transition>
@@ -4912,7 +4912,7 @@
   </p:clrMapOvr>
   <mc:AlternateContent xmlns:mc="http://schemas.openxmlformats.org/markup-compatibility/2006">
     <mc:Choice xmlns:p14="http://schemas.microsoft.com/office/powerpoint/2010/main" Requires="p14">
-      <p:transition spd="slow" p14:dur="3000">
+      <p:transition spd="slow" p14:dur="1500">
         <p14:reveal/>
       </p:transition>
     </mc:Choice>
@@ -5174,7 +5174,7 @@
   </p:clrMapOvr>
   <mc:AlternateContent xmlns:mc="http://schemas.openxmlformats.org/markup-compatibility/2006">
     <mc:Choice xmlns:p14="http://schemas.microsoft.com/office/powerpoint/2010/main" Requires="p14">
-      <p:transition spd="slow" p14:dur="3000">
+      <p:transition spd="slow" p14:dur="1500">
         <p14:reveal/>
       </p:transition>
     </mc:Choice>
@@ -5360,7 +5360,7 @@
   </p:clrMapOvr>
   <mc:AlternateContent xmlns:mc="http://schemas.openxmlformats.org/markup-compatibility/2006">
     <mc:Choice xmlns:p14="http://schemas.microsoft.com/office/powerpoint/2010/main" Requires="p14">
-      <p:transition spd="slow" p14:dur="3000">
+      <p:transition spd="slow" p14:dur="1500">
         <p14:reveal/>
       </p:transition>
     </mc:Choice>
@@ -5767,7 +5767,7 @@
   </p:clrMapOvr>
   <mc:AlternateContent xmlns:mc="http://schemas.openxmlformats.org/markup-compatibility/2006">
     <mc:Choice xmlns:p14="http://schemas.microsoft.com/office/powerpoint/2010/main" Requires="p14">
-      <p:transition spd="slow" p14:dur="3000">
+      <p:transition spd="slow" p14:dur="1500">
         <p14:reveal/>
       </p:transition>
     </mc:Choice>
@@ -6195,7 +6195,7 @@
   </p:clrMapOvr>
   <mc:AlternateContent xmlns:mc="http://schemas.openxmlformats.org/markup-compatibility/2006">
     <mc:Choice xmlns:p14="http://schemas.microsoft.com/office/powerpoint/2010/main" Requires="p14">
-      <p:transition spd="slow" p14:dur="3000">
+      <p:transition spd="slow" p14:dur="1500">
         <p14:reveal/>
       </p:transition>
     </mc:Choice>
@@ -6292,7 +6292,7 @@
   </p:clrMapOvr>
   <mc:AlternateContent xmlns:mc="http://schemas.openxmlformats.org/markup-compatibility/2006">
     <mc:Choice xmlns:p14="http://schemas.microsoft.com/office/powerpoint/2010/main" Requires="p14">
-      <p:transition spd="slow" p14:dur="3000">
+      <p:transition spd="slow" p14:dur="1500">
         <p14:reveal/>
       </p:transition>
     </mc:Choice>
@@ -6389,7 +6389,7 @@
   </p:clrMapOvr>
   <mc:AlternateContent xmlns:mc="http://schemas.openxmlformats.org/markup-compatibility/2006">
     <mc:Choice xmlns:p14="http://schemas.microsoft.com/office/powerpoint/2010/main" Requires="p14">
-      <p:transition spd="slow" p14:dur="3000">
+      <p:transition spd="slow" p14:dur="1500">
         <p14:reveal/>
       </p:transition>
     </mc:Choice>
@@ -6486,7 +6486,7 @@
   </p:clrMapOvr>
   <mc:AlternateContent xmlns:mc="http://schemas.openxmlformats.org/markup-compatibility/2006">
     <mc:Choice xmlns:p14="http://schemas.microsoft.com/office/powerpoint/2010/main" Requires="p14">
-      <p:transition spd="slow" p14:dur="3000">
+      <p:transition spd="slow" p14:dur="1500">
         <p14:reveal/>
       </p:transition>
     </mc:Choice>
@@ -6612,7 +6612,7 @@
   </p:clrMapOvr>
   <mc:AlternateContent xmlns:mc="http://schemas.openxmlformats.org/markup-compatibility/2006">
     <mc:Choice xmlns:p14="http://schemas.microsoft.com/office/powerpoint/2010/main" Requires="p14">
-      <p:transition spd="slow" p14:dur="3000">
+      <p:transition spd="slow" p14:dur="1500">
         <p14:reveal/>
       </p:transition>
     </mc:Choice>
@@ -6679,27 +6679,7 @@
                   </a:schemeClr>
                 </a:solidFill>
               </a:rPr>
-              <a:t>A</a:t>
-            </a:r>
-            <a:r>
-              <a:rPr lang="fr-FR" sz="6000" dirty="0" smtClean="0">
-                <a:solidFill>
-                  <a:schemeClr val="accent2">
-                    <a:lumMod val="75000"/>
-                  </a:schemeClr>
-                </a:solidFill>
-              </a:rPr>
-              <a:t>. </a:t>
-            </a:r>
-            <a:r>
-              <a:rPr lang="fr-FR" sz="6000" dirty="0" smtClean="0">
-                <a:solidFill>
-                  <a:schemeClr val="accent2">
-                    <a:lumMod val="75000"/>
-                  </a:schemeClr>
-                </a:solidFill>
-              </a:rPr>
-              <a:t>Plan projet</a:t>
+              <a:t>A. Plan projet</a:t>
             </a:r>
             <a:endParaRPr lang="fr-FR" sz="6000" dirty="0">
               <a:solidFill>
@@ -6750,15 +6730,7 @@
                   <a:srgbClr val="FFC000"/>
                 </a:solidFill>
               </a:rPr>
-              <a:t>) </a:t>
-            </a:r>
-            <a:r>
-              <a:rPr lang="fr-FR" sz="3200" dirty="0" smtClean="0">
-                <a:solidFill>
-                  <a:srgbClr val="FFC000"/>
-                </a:solidFill>
-              </a:rPr>
-              <a:t>Introduction</a:t>
+              <a:t>) Introduction</a:t>
             </a:r>
           </a:p>
           <a:p>
@@ -6819,13 +6791,13 @@
   <p:clrMapOvr>
     <a:masterClrMapping/>
   </p:clrMapOvr>
-  <mc:AlternateContent xmlns:mc="http://schemas.openxmlformats.org/markup-compatibility/2006" xmlns:p14="http://schemas.microsoft.com/office/powerpoint/2010/main">
-    <mc:Choice Requires="p14">
-      <p:transition spd="slow" p14:dur="3000">
+  <mc:AlternateContent xmlns:mc="http://schemas.openxmlformats.org/markup-compatibility/2006">
+    <mc:Choice xmlns:p14="http://schemas.microsoft.com/office/powerpoint/2010/main" Requires="p14">
+      <p:transition spd="slow" p14:dur="1500">
         <p14:reveal/>
       </p:transition>
     </mc:Choice>
-    <mc:Fallback xmlns="">
+    <mc:Fallback>
       <p:transition spd="slow">
         <p:fade/>
       </p:transition>
@@ -7001,7 +6973,7 @@
   </p:clrMapOvr>
   <mc:AlternateContent xmlns:mc="http://schemas.openxmlformats.org/markup-compatibility/2006">
     <mc:Choice xmlns:p14="http://schemas.microsoft.com/office/powerpoint/2010/main" Requires="p14">
-      <p:transition spd="slow" p14:dur="3000">
+      <p:transition spd="slow" p14:dur="1500">
         <p14:reveal/>
       </p:transition>
     </mc:Choice>
@@ -7145,7 +7117,7 @@
   </p:clrMapOvr>
   <mc:AlternateContent xmlns:mc="http://schemas.openxmlformats.org/markup-compatibility/2006">
     <mc:Choice xmlns:p14="http://schemas.microsoft.com/office/powerpoint/2010/main" Requires="p14">
-      <p:transition spd="slow" p14:dur="3000">
+      <p:transition spd="slow" p14:dur="1500">
         <p14:reveal/>
       </p:transition>
     </mc:Choice>
@@ -7228,7 +7200,7 @@
   </p:clrMapOvr>
   <mc:AlternateContent xmlns:mc="http://schemas.openxmlformats.org/markup-compatibility/2006">
     <mc:Choice xmlns:p14="http://schemas.microsoft.com/office/powerpoint/2010/main" Requires="p14">
-      <p:transition spd="slow" p14:dur="3000">
+      <p:transition spd="slow" p14:dur="1500">
         <p14:reveal/>
       </p:transition>
     </mc:Choice>
@@ -7311,7 +7283,7 @@
   </p:clrMapOvr>
   <mc:AlternateContent xmlns:mc="http://schemas.openxmlformats.org/markup-compatibility/2006">
     <mc:Choice xmlns:p14="http://schemas.microsoft.com/office/powerpoint/2010/main" Requires="p14">
-      <p:transition spd="slow" p14:dur="3000">
+      <p:transition spd="slow" p14:dur="1500">
         <p14:reveal/>
       </p:transition>
     </mc:Choice>
@@ -7394,7 +7366,7 @@
   </p:clrMapOvr>
   <mc:AlternateContent xmlns:mc="http://schemas.openxmlformats.org/markup-compatibility/2006">
     <mc:Choice xmlns:p14="http://schemas.microsoft.com/office/powerpoint/2010/main" Requires="p14">
-      <p:transition spd="slow" p14:dur="3000">
+      <p:transition spd="slow" p14:dur="1500">
         <p14:reveal/>
       </p:transition>
     </mc:Choice>
@@ -7477,7 +7449,7 @@
   </p:clrMapOvr>
   <mc:AlternateContent xmlns:mc="http://schemas.openxmlformats.org/markup-compatibility/2006">
     <mc:Choice xmlns:p14="http://schemas.microsoft.com/office/powerpoint/2010/main" Requires="p14">
-      <p:transition spd="slow" p14:dur="3000">
+      <p:transition spd="slow" p14:dur="1500">
         <p14:reveal/>
       </p:transition>
     </mc:Choice>
@@ -7575,7 +7547,7 @@
   </p:clrMapOvr>
   <mc:AlternateContent xmlns:mc="http://schemas.openxmlformats.org/markup-compatibility/2006">
     <mc:Choice xmlns:p14="http://schemas.microsoft.com/office/powerpoint/2010/main" Requires="p14">
-      <p:transition spd="slow" p14:dur="3000">
+      <p:transition spd="slow" p14:dur="1500">
         <p14:reveal/>
       </p:transition>
     </mc:Choice>
@@ -7696,7 +7668,7 @@
   </p:clrMapOvr>
   <mc:AlternateContent xmlns:mc="http://schemas.openxmlformats.org/markup-compatibility/2006">
     <mc:Choice xmlns:p14="http://schemas.microsoft.com/office/powerpoint/2010/main" Requires="p14">
-      <p:transition spd="slow" p14:dur="3000">
+      <p:transition spd="slow" p14:dur="1500">
         <p14:reveal/>
       </p:transition>
     </mc:Choice>
@@ -7877,7 +7849,7 @@
   </p:clrMapOvr>
   <mc:AlternateContent xmlns:mc="http://schemas.openxmlformats.org/markup-compatibility/2006">
     <mc:Choice xmlns:p14="http://schemas.microsoft.com/office/powerpoint/2010/main" Requires="p14">
-      <p:transition spd="slow" p14:dur="3000">
+      <p:transition spd="slow" p14:dur="1500">
         <p14:reveal/>
       </p:transition>
     </mc:Choice>
@@ -8057,7 +8029,7 @@
   </p:clrMapOvr>
   <mc:AlternateContent xmlns:mc="http://schemas.openxmlformats.org/markup-compatibility/2006">
     <mc:Choice xmlns:p14="http://schemas.microsoft.com/office/powerpoint/2010/main" Requires="p14">
-      <p:transition spd="slow" p14:dur="3000">
+      <p:transition spd="slow" p14:dur="1500">
         <p14:reveal/>
       </p:transition>
     </mc:Choice>
@@ -8263,17 +8235,7 @@
                   </a:schemeClr>
                 </a:solidFill>
               </a:rPr>
-              <a:t>. </a:t>
-            </a:r>
-            <a:r>
-              <a:rPr lang="fr-FR" sz="5400" dirty="0" smtClean="0">
-                <a:solidFill>
-                  <a:schemeClr val="accent2">
-                    <a:lumMod val="75000"/>
-                  </a:schemeClr>
-                </a:solidFill>
-              </a:rPr>
-              <a:t>Plan projet</a:t>
+              <a:t>. Plan projet</a:t>
             </a:r>
             <a:endParaRPr lang="fr-FR" sz="5400" dirty="0">
               <a:solidFill>
@@ -8295,13 +8257,13 @@
   <p:clrMapOvr>
     <a:masterClrMapping/>
   </p:clrMapOvr>
-  <mc:AlternateContent xmlns:mc="http://schemas.openxmlformats.org/markup-compatibility/2006" xmlns:p14="http://schemas.microsoft.com/office/powerpoint/2010/main">
-    <mc:Choice Requires="p14">
-      <p:transition spd="slow" p14:dur="3000">
+  <mc:AlternateContent xmlns:mc="http://schemas.openxmlformats.org/markup-compatibility/2006">
+    <mc:Choice xmlns:p14="http://schemas.microsoft.com/office/powerpoint/2010/main" Requires="p14">
+      <p:transition spd="slow" p14:dur="1500">
         <p14:reveal/>
       </p:transition>
     </mc:Choice>
-    <mc:Fallback xmlns="">
+    <mc:Fallback>
       <p:transition spd="slow">
         <p:fade/>
       </p:transition>
@@ -8649,13 +8611,13 @@
   <p:clrMapOvr>
     <a:masterClrMapping/>
   </p:clrMapOvr>
-  <mc:AlternateContent xmlns:mc="http://schemas.openxmlformats.org/markup-compatibility/2006" xmlns:p14="http://schemas.microsoft.com/office/powerpoint/2010/main">
-    <mc:Choice Requires="p14">
-      <p:transition spd="slow" p14:dur="3000">
+  <mc:AlternateContent xmlns:mc="http://schemas.openxmlformats.org/markup-compatibility/2006">
+    <mc:Choice xmlns:p14="http://schemas.microsoft.com/office/powerpoint/2010/main" Requires="p14">
+      <p:transition spd="slow" p14:dur="1500">
         <p14:reveal/>
       </p:transition>
     </mc:Choice>
-    <mc:Fallback xmlns="">
+    <mc:Fallback>
       <p:transition spd="slow">
         <p:fade/>
       </p:transition>
@@ -8862,13 +8824,13 @@
   <p:clrMapOvr>
     <a:masterClrMapping/>
   </p:clrMapOvr>
-  <mc:AlternateContent xmlns:mc="http://schemas.openxmlformats.org/markup-compatibility/2006" xmlns:p14="http://schemas.microsoft.com/office/powerpoint/2010/main">
-    <mc:Choice Requires="p14">
-      <p:transition spd="slow" p14:dur="3000">
+  <mc:AlternateContent xmlns:mc="http://schemas.openxmlformats.org/markup-compatibility/2006">
+    <mc:Choice xmlns:p14="http://schemas.microsoft.com/office/powerpoint/2010/main" Requires="p14">
+      <p:transition spd="slow" p14:dur="1500">
         <p14:reveal/>
       </p:transition>
     </mc:Choice>
-    <mc:Fallback xmlns="">
+    <mc:Fallback>
       <p:transition spd="slow">
         <p:fade/>
       </p:transition>
@@ -9100,13 +9062,13 @@
   <p:clrMapOvr>
     <a:masterClrMapping/>
   </p:clrMapOvr>
-  <mc:AlternateContent xmlns:mc="http://schemas.openxmlformats.org/markup-compatibility/2006" xmlns:p14="http://schemas.microsoft.com/office/powerpoint/2010/main">
-    <mc:Choice Requires="p14">
-      <p:transition spd="slow" p14:dur="3000">
+  <mc:AlternateContent xmlns:mc="http://schemas.openxmlformats.org/markup-compatibility/2006">
+    <mc:Choice xmlns:p14="http://schemas.microsoft.com/office/powerpoint/2010/main" Requires="p14">
+      <p:transition spd="slow" p14:dur="1500">
         <p14:reveal/>
       </p:transition>
     </mc:Choice>
-    <mc:Fallback xmlns="">
+    <mc:Fallback>
       <p:transition spd="slow">
         <p:fade/>
       </p:transition>
@@ -9235,12 +9197,12 @@
               </a:buClr>
             </a:pPr>
             <a:r>
-              <a:rPr lang="fr-FR" sz="2400" dirty="0" err="1" smtClean="0">
+              <a:rPr lang="fr-FR" sz="2400" dirty="0" smtClean="0">
                 <a:solidFill>
                   <a:srgbClr val="FF0000"/>
                 </a:solidFill>
               </a:rPr>
-              <a:t>Exigenges</a:t>
+              <a:t>Exigences </a:t>
             </a:r>
             <a:r>
               <a:rPr lang="fr-FR" sz="2400" dirty="0" smtClean="0">
@@ -9248,7 +9210,7 @@
                   <a:srgbClr val="FF0000"/>
                 </a:solidFill>
               </a:rPr>
-              <a:t> / Risques identifiés</a:t>
+              <a:t>/ Risques identifiés</a:t>
             </a:r>
             <a:endParaRPr lang="fr-FR" sz="2400" dirty="0">
               <a:solidFill>
@@ -9302,13 +9264,13 @@
   <p:clrMapOvr>
     <a:masterClrMapping/>
   </p:clrMapOvr>
-  <mc:AlternateContent xmlns:mc="http://schemas.openxmlformats.org/markup-compatibility/2006" xmlns:p14="http://schemas.microsoft.com/office/powerpoint/2010/main">
-    <mc:Choice Requires="p14">
-      <p:transition spd="slow" p14:dur="3000">
+  <mc:AlternateContent xmlns:mc="http://schemas.openxmlformats.org/markup-compatibility/2006">
+    <mc:Choice xmlns:p14="http://schemas.microsoft.com/office/powerpoint/2010/main" Requires="p14">
+      <p:transition spd="slow" p14:dur="1500">
         <p14:reveal/>
       </p:transition>
     </mc:Choice>
-    <mc:Fallback xmlns="">
+    <mc:Fallback>
       <p:transition spd="slow">
         <p:fade/>
       </p:transition>
@@ -9495,13 +9457,13 @@
   <p:clrMapOvr>
     <a:masterClrMapping/>
   </p:clrMapOvr>
-  <mc:AlternateContent xmlns:mc="http://schemas.openxmlformats.org/markup-compatibility/2006" xmlns:p14="http://schemas.microsoft.com/office/powerpoint/2010/main">
-    <mc:Choice Requires="p14">
-      <p:transition spd="slow" p14:dur="3000">
+  <mc:AlternateContent xmlns:mc="http://schemas.openxmlformats.org/markup-compatibility/2006">
+    <mc:Choice xmlns:p14="http://schemas.microsoft.com/office/powerpoint/2010/main" Requires="p14">
+      <p:transition spd="slow" p14:dur="1500">
         <p14:reveal/>
       </p:transition>
     </mc:Choice>
-    <mc:Fallback xmlns="">
+    <mc:Fallback>
       <p:transition spd="slow">
         <p:fade/>
       </p:transition>
@@ -9648,11 +9610,7 @@
             </a:r>
             <a:r>
               <a:rPr lang="fr-FR" dirty="0" smtClean="0"/>
-              <a:t> </a:t>
-            </a:r>
-            <a:r>
-              <a:rPr lang="fr-FR" dirty="0" smtClean="0"/>
-              <a:t>Mini-Calculatrice</a:t>
+              <a:t> Mini-Calculatrice</a:t>
             </a:r>
           </a:p>
           <a:p>
@@ -9680,13 +9638,13 @@
   <p:clrMapOvr>
     <a:masterClrMapping/>
   </p:clrMapOvr>
-  <mc:AlternateContent xmlns:mc="http://schemas.openxmlformats.org/markup-compatibility/2006" xmlns:p14="http://schemas.microsoft.com/office/powerpoint/2010/main">
-    <mc:Choice Requires="p14">
-      <p:transition spd="slow" p14:dur="3000">
+  <mc:AlternateContent xmlns:mc="http://schemas.openxmlformats.org/markup-compatibility/2006">
+    <mc:Choice xmlns:p14="http://schemas.microsoft.com/office/powerpoint/2010/main" Requires="p14">
+      <p:transition spd="slow" p14:dur="1500">
         <p14:reveal/>
       </p:transition>
     </mc:Choice>
-    <mc:Fallback xmlns="">
+    <mc:Fallback>
       <p:transition spd="slow">
         <p:fade/>
       </p:transition>
@@ -9745,7 +9703,7 @@
     </a:clrScheme>
     <a:fontScheme name="Rétrospective">
       <a:majorFont>
-        <a:latin typeface="Calibri Light" panose="020F0302020204030204"/>
+        <a:latin typeface="Calibri Light"/>
         <a:ea typeface=""/>
         <a:cs typeface=""/>
         <a:font script="Jpan" typeface="ＭＳ Ｐゴシック"/>
@@ -9780,7 +9738,7 @@
         <a:font script="Geor" typeface="Sylfaen"/>
       </a:majorFont>
       <a:minorFont>
-        <a:latin typeface="Calibri" panose="020F0502020204030204"/>
+        <a:latin typeface="Calibri"/>
         <a:ea typeface=""/>
         <a:cs typeface=""/>
         <a:font script="Jpan" typeface="ＭＳ Ｐゴシック"/>
@@ -9979,7 +9937,7 @@
   <a:extraClrSchemeLst/>
   <a:extLst>
     <a:ext uri="{05A4C25C-085E-4340-85A3-A5531E510DB2}">
-      <thm15:themeFamily xmlns:thm15="http://schemas.microsoft.com/office/thememl/2012/main" name="Retrospect" id="{5F128B03-DCCA-4EEB-AB3B-CF2899314A46}" vid="{3F1AAB62-24C6-49D2-8E01-B56FAC9A3DCD}"/>
+      <thm15:themeFamily xmlns:thm15="http://schemas.microsoft.com/office/thememl/2012/main" xmlns="" name="Retrospect" id="{5F128B03-DCCA-4EEB-AB3B-CF2899314A46}" vid="{3F1AAB62-24C6-49D2-8E01-B56FAC9A3DCD}"/>
     </a:ext>
   </a:extLst>
 </a:theme>

</xml_diff>